<commit_message>
Imported source data into PowerBI query and transformed the data
</commit_message>
<xml_diff>
--- a/Problem statement.pptx
+++ b/Problem statement.pptx
@@ -4934,6 +4934,16 @@
               </a:rPr>
             </a:br>
             <a:r>
+              <a:rPr lang="en-US" sz="1900" dirty="0" smtClean="0">
+                <a:solidFill>
+                  <a:schemeClr val="tx2">
+                    <a:lumMod val="75000"/>
+                  </a:schemeClr>
+                </a:solidFill>
+              </a:rPr>
+              <a:t>As </a:t>
+            </a:r>
+            <a:r>
               <a:rPr lang="en-US" sz="1900" dirty="0">
                 <a:solidFill>
                   <a:schemeClr val="tx2">
@@ -4941,7 +4951,7 @@
                   </a:schemeClr>
                 </a:solidFill>
               </a:rPr>
-              <a:t>You are a data analyst who has been provided with sample data and a mock-up dashboard to work on the following task. You can download all relevant documents from the download section</a:t>
+              <a:t>a data </a:t>
             </a:r>
             <a:r>
               <a:rPr lang="en-US" sz="1900" dirty="0" smtClean="0">
@@ -4951,7 +4961,37 @@
                   </a:schemeClr>
                 </a:solidFill>
               </a:rPr>
-              <a:t>.</a:t>
+              <a:t>analyst,  I have </a:t>
+            </a:r>
+            <a:r>
+              <a:rPr lang="en-US" sz="1900" dirty="0">
+                <a:solidFill>
+                  <a:schemeClr val="tx2">
+                    <a:lumMod val="75000"/>
+                  </a:schemeClr>
+                </a:solidFill>
+              </a:rPr>
+              <a:t>been provided with sample data and a mock-up dashboard to work on the following task. </a:t>
+            </a:r>
+            <a:r>
+              <a:rPr lang="en-US" sz="1900" dirty="0" smtClean="0">
+                <a:solidFill>
+                  <a:schemeClr val="tx2">
+                    <a:lumMod val="75000"/>
+                  </a:schemeClr>
+                </a:solidFill>
+              </a:rPr>
+              <a:t>The key </a:t>
+            </a:r>
+            <a:r>
+              <a:rPr lang="en-US" sz="1900" smtClean="0">
+                <a:solidFill>
+                  <a:schemeClr val="tx2">
+                    <a:lumMod val="75000"/>
+                  </a:schemeClr>
+                </a:solidFill>
+              </a:rPr>
+              <a:t>objectives are:</a:t>
             </a:r>
           </a:p>
           <a:p>

</xml_diff>